<commit_message>
Recorded on video 20170201. Minor improvements.
</commit_message>
<xml_diff>
--- a/Reference Applications on Java.pptx
+++ b/Reference Applications on Java.pptx
@@ -249,7 +249,7 @@
           <a:p>
             <a:fld id="{ED420793-173B-4658-8043-7F15A4EF911C}" type="datetimeFigureOut">
               <a:rPr lang="en-US" smtClean="0"/>
-              <a:t>1/31/2017</a:t>
+              <a:t>2/1/2017</a:t>
             </a:fld>
             <a:endParaRPr lang="en-US"/>
           </a:p>
@@ -419,7 +419,7 @@
           <a:p>
             <a:fld id="{ED420793-173B-4658-8043-7F15A4EF911C}" type="datetimeFigureOut">
               <a:rPr lang="en-US" smtClean="0"/>
-              <a:t>1/31/2017</a:t>
+              <a:t>2/1/2017</a:t>
             </a:fld>
             <a:endParaRPr lang="en-US"/>
           </a:p>
@@ -599,7 +599,7 @@
           <a:p>
             <a:fld id="{ED420793-173B-4658-8043-7F15A4EF911C}" type="datetimeFigureOut">
               <a:rPr lang="en-US" smtClean="0"/>
-              <a:t>1/31/2017</a:t>
+              <a:t>2/1/2017</a:t>
             </a:fld>
             <a:endParaRPr lang="en-US"/>
           </a:p>
@@ -769,7 +769,7 @@
           <a:p>
             <a:fld id="{ED420793-173B-4658-8043-7F15A4EF911C}" type="datetimeFigureOut">
               <a:rPr lang="en-US" smtClean="0"/>
-              <a:t>1/31/2017</a:t>
+              <a:t>2/1/2017</a:t>
             </a:fld>
             <a:endParaRPr lang="en-US"/>
           </a:p>
@@ -1015,7 +1015,7 @@
           <a:p>
             <a:fld id="{ED420793-173B-4658-8043-7F15A4EF911C}" type="datetimeFigureOut">
               <a:rPr lang="en-US" smtClean="0"/>
-              <a:t>1/31/2017</a:t>
+              <a:t>2/1/2017</a:t>
             </a:fld>
             <a:endParaRPr lang="en-US"/>
           </a:p>
@@ -1247,7 +1247,7 @@
           <a:p>
             <a:fld id="{ED420793-173B-4658-8043-7F15A4EF911C}" type="datetimeFigureOut">
               <a:rPr lang="en-US" smtClean="0"/>
-              <a:t>1/31/2017</a:t>
+              <a:t>2/1/2017</a:t>
             </a:fld>
             <a:endParaRPr lang="en-US"/>
           </a:p>
@@ -1614,7 +1614,7 @@
           <a:p>
             <a:fld id="{ED420793-173B-4658-8043-7F15A4EF911C}" type="datetimeFigureOut">
               <a:rPr lang="en-US" smtClean="0"/>
-              <a:t>1/31/2017</a:t>
+              <a:t>2/1/2017</a:t>
             </a:fld>
             <a:endParaRPr lang="en-US"/>
           </a:p>
@@ -1732,7 +1732,7 @@
           <a:p>
             <a:fld id="{ED420793-173B-4658-8043-7F15A4EF911C}" type="datetimeFigureOut">
               <a:rPr lang="en-US" smtClean="0"/>
-              <a:t>1/31/2017</a:t>
+              <a:t>2/1/2017</a:t>
             </a:fld>
             <a:endParaRPr lang="en-US"/>
           </a:p>
@@ -1827,7 +1827,7 @@
           <a:p>
             <a:fld id="{ED420793-173B-4658-8043-7F15A4EF911C}" type="datetimeFigureOut">
               <a:rPr lang="en-US" smtClean="0"/>
-              <a:t>1/31/2017</a:t>
+              <a:t>2/1/2017</a:t>
             </a:fld>
             <a:endParaRPr lang="en-US"/>
           </a:p>
@@ -2104,7 +2104,7 @@
           <a:p>
             <a:fld id="{ED420793-173B-4658-8043-7F15A4EF911C}" type="datetimeFigureOut">
               <a:rPr lang="en-US" smtClean="0"/>
-              <a:t>1/31/2017</a:t>
+              <a:t>2/1/2017</a:t>
             </a:fld>
             <a:endParaRPr lang="en-US"/>
           </a:p>
@@ -2357,7 +2357,7 @@
           <a:p>
             <a:fld id="{ED420793-173B-4658-8043-7F15A4EF911C}" type="datetimeFigureOut">
               <a:rPr lang="en-US" smtClean="0"/>
-              <a:t>1/31/2017</a:t>
+              <a:t>2/1/2017</a:t>
             </a:fld>
             <a:endParaRPr lang="en-US"/>
           </a:p>
@@ -2570,7 +2570,7 @@
           <a:p>
             <a:fld id="{ED420793-173B-4658-8043-7F15A4EF911C}" type="datetimeFigureOut">
               <a:rPr lang="en-US" smtClean="0"/>
-              <a:t>1/31/2017</a:t>
+              <a:t>2/1/2017</a:t>
             </a:fld>
             <a:endParaRPr lang="en-US"/>
           </a:p>
@@ -2992,7 +2992,19 @@
           <a:p>
             <a:r>
               <a:rPr lang="en-US" dirty="0" smtClean="0"/>
-              <a:t>Why Reference Applications on Java?</a:t>
+              <a:t>Why Reference Applications </a:t>
+            </a:r>
+            <a:r>
+              <a:rPr lang="en-US" dirty="0" smtClean="0"/>
+              <a:t>in </a:t>
+            </a:r>
+            <a:r>
+              <a:rPr lang="en-US" dirty="0" smtClean="0"/>
+              <a:t>Java</a:t>
+            </a:r>
+            <a:r>
+              <a:rPr lang="en-US" dirty="0" smtClean="0"/>
+              <a:t>?</a:t>
             </a:r>
             <a:endParaRPr lang="en-US" dirty="0"/>
           </a:p>
@@ -3224,7 +3236,11 @@
           <a:p>
             <a:r>
               <a:rPr lang="en-US" dirty="0" smtClean="0"/>
-              <a:t>Databricks Reference Applications on Java</a:t>
+              <a:t>Databricks Reference Applications </a:t>
+            </a:r>
+            <a:r>
+              <a:rPr lang="en-US" dirty="0" smtClean="0"/>
+              <a:t>in Java</a:t>
             </a:r>
             <a:endParaRPr lang="en-US" dirty="0"/>
           </a:p>
@@ -3256,18 +3272,28 @@
               <a:rPr lang="en-US" dirty="0" smtClean="0"/>
               <a:t>No Twitter Language Classifier, no Weather Time Series</a:t>
             </a:r>
-          </a:p>
-          <a:p>
-            <a:r>
-              <a:rPr lang="en-US" dirty="0" smtClean="0"/>
-              <a:t>Java 8</a:t>
-            </a:r>
-          </a:p>
-          <a:p>
-            <a:r>
-              <a:rPr lang="en-US" dirty="0" smtClean="0"/>
-              <a:t>Spark 2.0</a:t>
-            </a:r>
+            <a:endParaRPr lang="en-US" dirty="0"/>
+          </a:p>
+          <a:p>
+            <a:r>
+              <a:rPr lang="en-US" dirty="0"/>
+              <a:t>Spark </a:t>
+            </a:r>
+            <a:r>
+              <a:rPr lang="en-US" dirty="0" smtClean="0"/>
+              <a:t>2.0</a:t>
+            </a:r>
+          </a:p>
+          <a:p>
+            <a:r>
+              <a:rPr lang="en-US" dirty="0" smtClean="0"/>
+              <a:t>Java </a:t>
+            </a:r>
+            <a:r>
+              <a:rPr lang="en-US" dirty="0"/>
+              <a:t>8</a:t>
+            </a:r>
+            <a:endParaRPr lang="en-US" dirty="0" smtClean="0"/>
           </a:p>
         </p:txBody>
       </p:sp>
@@ -3325,7 +3351,7 @@
           <a:p>
             <a:r>
               <a:rPr lang="en-US" dirty="0" smtClean="0"/>
-              <a:t>Structure</a:t>
+              <a:t>Log Analyzer Structure</a:t>
             </a:r>
             <a:endParaRPr lang="en-US" dirty="0"/>
           </a:p>
@@ -3472,18 +3498,6 @@
           <a:p>
             <a:r>
               <a:rPr lang="en-US" dirty="0" smtClean="0"/>
-              <a:t>Real-time input data</a:t>
-            </a:r>
-          </a:p>
-          <a:p>
-            <a:r>
-              <a:rPr lang="en-US" dirty="0" smtClean="0"/>
-              <a:t>Sliding window and total</a:t>
-            </a:r>
-          </a:p>
-          <a:p>
-            <a:r>
-              <a:rPr lang="en-US" dirty="0" smtClean="0"/>
               <a:t>Statistics on HTTP requests</a:t>
             </a:r>
           </a:p>
@@ -3514,6 +3528,34 @@
               <a:rPr lang="en-US" dirty="0" smtClean="0"/>
               <a:t>top 10 accessed endpoints</a:t>
             </a:r>
+          </a:p>
+          <a:p>
+            <a:r>
+              <a:rPr lang="en-US" dirty="0" smtClean="0"/>
+              <a:t>Sliding </a:t>
+            </a:r>
+            <a:r>
+              <a:rPr lang="en-US" dirty="0"/>
+              <a:t>window and </a:t>
+            </a:r>
+            <a:r>
+              <a:rPr lang="en-US" dirty="0" smtClean="0"/>
+              <a:t>total</a:t>
+            </a:r>
+          </a:p>
+          <a:p>
+            <a:r>
+              <a:rPr lang="en-US" dirty="0"/>
+              <a:t>Real-time input </a:t>
+            </a:r>
+            <a:r>
+              <a:rPr lang="en-US" dirty="0" smtClean="0"/>
+              <a:t>data</a:t>
+            </a:r>
+            <a:endParaRPr lang="en-US" dirty="0"/>
+          </a:p>
+          <a:p>
+            <a:endParaRPr lang="en-US" dirty="0" smtClean="0"/>
           </a:p>
           <a:p>
             <a:endParaRPr lang="en-US" dirty="0" smtClean="0"/>
@@ -3939,10 +3981,9 @@
           <a:p>
             <a:pPr lvl="1"/>
             <a:r>
-              <a:rPr lang="en-US" smtClean="0"/>
+              <a:rPr lang="en-US" dirty="0" smtClean="0"/>
               <a:t>Large data</a:t>
             </a:r>
-            <a:endParaRPr lang="en-US" dirty="0" smtClean="0"/>
           </a:p>
           <a:p>
             <a:pPr lvl="1"/>
@@ -4004,7 +4045,11 @@
           <a:p>
             <a:r>
               <a:rPr lang="en-US" dirty="0" smtClean="0"/>
-              <a:t>Java Ref Apps: For Java folks’ wealth and joy</a:t>
+              <a:t>Java Ref Apps: For Java folks’ wealth and </a:t>
+            </a:r>
+            <a:r>
+              <a:rPr lang="en-US" dirty="0" smtClean="0"/>
+              <a:t>joy</a:t>
             </a:r>
             <a:endParaRPr lang="en-US" dirty="0"/>
           </a:p>

</xml_diff>